<commit_message>
- Reverted changes to default parameters. - New images - Added Example folder
</commit_message>
<xml_diff>
--- a/Bot_Ticelli/docs/imgs/imgs.pptx
+++ b/Bot_Ticelli/docs/imgs/imgs.pptx
@@ -269,7 +269,7 @@
           <a:p>
             <a:fld id="{650D7D2F-FCDF-4147-9AF4-84C23157C973}" type="datetimeFigureOut">
               <a:rPr lang="it-IT" smtClean="0"/>
-              <a:t>24/10/2018</a:t>
+              <a:t>25/10/2018</a:t>
             </a:fld>
             <a:endParaRPr lang="it-IT" dirty="0"/>
           </a:p>
@@ -469,7 +469,7 @@
           <a:p>
             <a:fld id="{650D7D2F-FCDF-4147-9AF4-84C23157C973}" type="datetimeFigureOut">
               <a:rPr lang="it-IT" smtClean="0"/>
-              <a:t>24/10/2018</a:t>
+              <a:t>25/10/2018</a:t>
             </a:fld>
             <a:endParaRPr lang="it-IT" dirty="0"/>
           </a:p>
@@ -679,7 +679,7 @@
           <a:p>
             <a:fld id="{650D7D2F-FCDF-4147-9AF4-84C23157C973}" type="datetimeFigureOut">
               <a:rPr lang="it-IT" smtClean="0"/>
-              <a:t>24/10/2018</a:t>
+              <a:t>25/10/2018</a:t>
             </a:fld>
             <a:endParaRPr lang="it-IT" dirty="0"/>
           </a:p>
@@ -879,7 +879,7 @@
           <a:p>
             <a:fld id="{650D7D2F-FCDF-4147-9AF4-84C23157C973}" type="datetimeFigureOut">
               <a:rPr lang="it-IT" smtClean="0"/>
-              <a:t>24/10/2018</a:t>
+              <a:t>25/10/2018</a:t>
             </a:fld>
             <a:endParaRPr lang="it-IT" dirty="0"/>
           </a:p>
@@ -1155,7 +1155,7 @@
           <a:p>
             <a:fld id="{650D7D2F-FCDF-4147-9AF4-84C23157C973}" type="datetimeFigureOut">
               <a:rPr lang="it-IT" smtClean="0"/>
-              <a:t>24/10/2018</a:t>
+              <a:t>25/10/2018</a:t>
             </a:fld>
             <a:endParaRPr lang="it-IT" dirty="0"/>
           </a:p>
@@ -1423,7 +1423,7 @@
           <a:p>
             <a:fld id="{650D7D2F-FCDF-4147-9AF4-84C23157C973}" type="datetimeFigureOut">
               <a:rPr lang="it-IT" smtClean="0"/>
-              <a:t>24/10/2018</a:t>
+              <a:t>25/10/2018</a:t>
             </a:fld>
             <a:endParaRPr lang="it-IT" dirty="0"/>
           </a:p>
@@ -1838,7 +1838,7 @@
           <a:p>
             <a:fld id="{650D7D2F-FCDF-4147-9AF4-84C23157C973}" type="datetimeFigureOut">
               <a:rPr lang="it-IT" smtClean="0"/>
-              <a:t>24/10/2018</a:t>
+              <a:t>25/10/2018</a:t>
             </a:fld>
             <a:endParaRPr lang="it-IT" dirty="0"/>
           </a:p>
@@ -1980,7 +1980,7 @@
           <a:p>
             <a:fld id="{650D7D2F-FCDF-4147-9AF4-84C23157C973}" type="datetimeFigureOut">
               <a:rPr lang="it-IT" smtClean="0"/>
-              <a:t>24/10/2018</a:t>
+              <a:t>25/10/2018</a:t>
             </a:fld>
             <a:endParaRPr lang="it-IT" dirty="0"/>
           </a:p>
@@ -2093,7 +2093,7 @@
           <a:p>
             <a:fld id="{650D7D2F-FCDF-4147-9AF4-84C23157C973}" type="datetimeFigureOut">
               <a:rPr lang="it-IT" smtClean="0"/>
-              <a:t>24/10/2018</a:t>
+              <a:t>25/10/2018</a:t>
             </a:fld>
             <a:endParaRPr lang="it-IT" dirty="0"/>
           </a:p>
@@ -2406,7 +2406,7 @@
           <a:p>
             <a:fld id="{650D7D2F-FCDF-4147-9AF4-84C23157C973}" type="datetimeFigureOut">
               <a:rPr lang="it-IT" smtClean="0"/>
-              <a:t>24/10/2018</a:t>
+              <a:t>25/10/2018</a:t>
             </a:fld>
             <a:endParaRPr lang="it-IT" dirty="0"/>
           </a:p>
@@ -2695,7 +2695,7 @@
           <a:p>
             <a:fld id="{650D7D2F-FCDF-4147-9AF4-84C23157C973}" type="datetimeFigureOut">
               <a:rPr lang="it-IT" smtClean="0"/>
-              <a:t>24/10/2018</a:t>
+              <a:t>25/10/2018</a:t>
             </a:fld>
             <a:endParaRPr lang="it-IT" dirty="0"/>
           </a:p>
@@ -2938,7 +2938,7 @@
           <a:p>
             <a:fld id="{650D7D2F-FCDF-4147-9AF4-84C23157C973}" type="datetimeFigureOut">
               <a:rPr lang="it-IT" smtClean="0"/>
-              <a:t>24/10/2018</a:t>
+              <a:t>25/10/2018</a:t>
             </a:fld>
             <a:endParaRPr lang="it-IT" dirty="0"/>
           </a:p>
@@ -3369,7 +3369,7 @@
         </p:nvSpPr>
         <p:spPr>
           <a:xfrm>
-            <a:off x="2707689" y="665826"/>
+            <a:off x="869458" y="182548"/>
             <a:ext cx="2587839" cy="2334826"/>
           </a:xfrm>
           <a:prstGeom prst="rect">
@@ -3449,8 +3449,8 @@
         </p:nvSpPr>
         <p:spPr>
           <a:xfrm>
-            <a:off x="4777664" y="3773010"/>
-            <a:ext cx="2769833" cy="2490185"/>
+            <a:off x="2939436" y="3145469"/>
+            <a:ext cx="2769833" cy="3058356"/>
           </a:xfrm>
           <a:prstGeom prst="rect">
             <a:avLst/>
@@ -3478,9 +3478,34 @@
           <a:p>
             <a:pPr algn="ctr"/>
             <a:r>
+              <a:rPr lang="en-US" dirty="0" err="1"/>
+              <a:t>Calcolo</a:t>
+            </a:r>
+            <a:r>
               <a:rPr lang="en-US" dirty="0"/>
-              <a:t>Calcolo dei Fenotipi</a:t>
+              <a:t> </a:t>
             </a:r>
+            <a:r>
+              <a:rPr lang="en-US" dirty="0" err="1"/>
+              <a:t>dei</a:t>
+            </a:r>
+            <a:r>
+              <a:rPr lang="en-US" dirty="0"/>
+              <a:t> </a:t>
+            </a:r>
+            <a:r>
+              <a:rPr lang="en-US" dirty="0" err="1"/>
+              <a:t>Fenotipi</a:t>
+            </a:r>
+            <a:endParaRPr lang="en-US" dirty="0"/>
+          </a:p>
+          <a:p>
+            <a:pPr algn="ctr"/>
+            <a:endParaRPr lang="en-US" dirty="0"/>
+          </a:p>
+          <a:p>
+            <a:pPr algn="ctr"/>
+            <a:endParaRPr lang="en-US" dirty="0"/>
           </a:p>
           <a:p>
             <a:pPr algn="ctr"/>
@@ -3522,7 +3547,7 @@
         </p:nvSpPr>
         <p:spPr>
           <a:xfrm>
-            <a:off x="7037033" y="1154097"/>
+            <a:off x="5198802" y="670819"/>
             <a:ext cx="1597980" cy="1367161"/>
           </a:xfrm>
           <a:prstGeom prst="rect">
@@ -3578,7 +3603,7 @@
         </p:nvSpPr>
         <p:spPr>
           <a:xfrm>
-            <a:off x="2098086" y="4336742"/>
+            <a:off x="188839" y="3991066"/>
             <a:ext cx="1597980" cy="1367161"/>
           </a:xfrm>
           <a:prstGeom prst="rect">
@@ -3637,9 +3662,9 @@
           <p:nvPr/>
         </p:nvCxnSpPr>
         <p:spPr>
-          <a:xfrm flipV="1">
-            <a:off x="3696066" y="5018103"/>
-            <a:ext cx="1081598" cy="2220"/>
+          <a:xfrm>
+            <a:off x="1786819" y="4674647"/>
+            <a:ext cx="1152617" cy="0"/>
           </a:xfrm>
           <a:prstGeom prst="straightConnector1">
             <a:avLst/>
@@ -3683,7 +3708,7 @@
         </p:nvCxnSpPr>
         <p:spPr>
           <a:xfrm>
-            <a:off x="4001609" y="3000652"/>
+            <a:off x="2163378" y="2517374"/>
             <a:ext cx="776055" cy="765700"/>
           </a:xfrm>
           <a:prstGeom prst="straightConnector1">
@@ -3728,8 +3753,8 @@
         </p:nvCxnSpPr>
         <p:spPr>
           <a:xfrm flipV="1">
-            <a:off x="6961571" y="2521258"/>
-            <a:ext cx="874452" cy="1251752"/>
+            <a:off x="5314950" y="2037980"/>
+            <a:ext cx="682842" cy="1107489"/>
           </a:xfrm>
           <a:prstGeom prst="straightConnector1">
             <a:avLst/>
@@ -3774,7 +3799,7 @@
         </p:nvCxnSpPr>
         <p:spPr>
           <a:xfrm flipH="1" flipV="1">
-            <a:off x="5295528" y="1833239"/>
+            <a:off x="3457297" y="1349961"/>
             <a:ext cx="1741505" cy="4439"/>
           </a:xfrm>
           <a:prstGeom prst="straightConnector1">
@@ -3816,7 +3841,7 @@
         </p:nvSpPr>
         <p:spPr>
           <a:xfrm>
-            <a:off x="8629095" y="4336742"/>
+            <a:off x="6861886" y="3991066"/>
             <a:ext cx="1597980" cy="1367161"/>
           </a:xfrm>
           <a:prstGeom prst="rect">
@@ -3869,8 +3894,8 @@
         </p:nvCxnSpPr>
         <p:spPr>
           <a:xfrm>
-            <a:off x="7547497" y="5018103"/>
-            <a:ext cx="1081598" cy="2220"/>
+            <a:off x="5709269" y="4674647"/>
+            <a:ext cx="1152617" cy="0"/>
           </a:xfrm>
           <a:prstGeom prst="straightConnector1">
             <a:avLst/>
@@ -3911,7 +3936,7 @@
         </p:nvSpPr>
         <p:spPr>
           <a:xfrm>
-            <a:off x="3383129" y="1360501"/>
+            <a:off x="1544898" y="877223"/>
             <a:ext cx="1236958" cy="488273"/>
           </a:xfrm>
           <a:prstGeom prst="rect">
@@ -3966,7 +3991,7 @@
         </p:nvSpPr>
         <p:spPr>
           <a:xfrm>
-            <a:off x="3383129" y="1889832"/>
+            <a:off x="1544898" y="1406554"/>
             <a:ext cx="1236958" cy="488273"/>
           </a:xfrm>
           <a:prstGeom prst="rect">
@@ -4020,7 +4045,7 @@
         </p:nvSpPr>
         <p:spPr>
           <a:xfrm>
-            <a:off x="3383129" y="2414725"/>
+            <a:off x="1544898" y="1931447"/>
             <a:ext cx="1236958" cy="488273"/>
           </a:xfrm>
           <a:prstGeom prst="rect">
@@ -4075,7 +4100,7 @@
         </p:nvSpPr>
         <p:spPr>
           <a:xfrm>
-            <a:off x="5263708" y="4490988"/>
+            <a:off x="3425480" y="3863447"/>
             <a:ext cx="1827328" cy="488273"/>
           </a:xfrm>
           <a:prstGeom prst="rect">
@@ -4130,7 +4155,7 @@
         </p:nvSpPr>
         <p:spPr>
           <a:xfrm>
-            <a:off x="5263708" y="5024761"/>
+            <a:off x="3425480" y="4397220"/>
             <a:ext cx="1827327" cy="488273"/>
           </a:xfrm>
           <a:prstGeom prst="rect">
@@ -4185,7 +4210,7 @@
         </p:nvSpPr>
         <p:spPr>
           <a:xfrm>
-            <a:off x="5263709" y="5553536"/>
+            <a:off x="3425481" y="4925995"/>
             <a:ext cx="1827326" cy="488273"/>
           </a:xfrm>
           <a:prstGeom prst="rect">
@@ -4221,6 +4246,61 @@
             <a:r>
               <a:rPr lang="en-US" dirty="0" err="1"/>
               <a:t>Saturazione</a:t>
+            </a:r>
+            <a:endParaRPr lang="en-US" dirty="0"/>
+          </a:p>
+        </p:txBody>
+      </p:sp>
+      <p:sp>
+        <p:nvSpPr>
+          <p:cNvPr id="20" name="Rectangle 19">
+            <a:extLst>
+              <a:ext uri="{FF2B5EF4-FFF2-40B4-BE49-F238E27FC236}">
+                <a16:creationId xmlns:a16="http://schemas.microsoft.com/office/drawing/2014/main" id="{9ADBDE48-C0EC-4213-9C7B-F11F4CF54E57}"/>
+              </a:ext>
+            </a:extLst>
+          </p:cNvPr>
+          <p:cNvSpPr/>
+          <p:nvPr/>
+        </p:nvSpPr>
+        <p:spPr>
+          <a:xfrm>
+            <a:off x="3425481" y="5454770"/>
+            <a:ext cx="1827326" cy="488273"/>
+          </a:xfrm>
+          <a:prstGeom prst="rect">
+            <a:avLst/>
+          </a:prstGeom>
+          <a:solidFill>
+            <a:schemeClr val="accent1">
+              <a:lumMod val="50000"/>
+            </a:schemeClr>
+          </a:solidFill>
+        </p:spPr>
+        <p:style>
+          <a:lnRef idx="2">
+            <a:schemeClr val="accent1">
+              <a:shade val="50000"/>
+            </a:schemeClr>
+          </a:lnRef>
+          <a:fillRef idx="1">
+            <a:schemeClr val="accent1"/>
+          </a:fillRef>
+          <a:effectRef idx="0">
+            <a:schemeClr val="accent1"/>
+          </a:effectRef>
+          <a:fontRef idx="minor">
+            <a:schemeClr val="lt1"/>
+          </a:fontRef>
+        </p:style>
+        <p:txBody>
+          <a:bodyPr rtlCol="0" anchor="ctr"/>
+          <a:lstStyle/>
+          <a:p>
+            <a:pPr algn="ctr"/>
+            <a:r>
+              <a:rPr lang="en-US" dirty="0" err="1"/>
+              <a:t>Quantizzazione</a:t>
             </a:r>
             <a:endParaRPr lang="en-US" dirty="0"/>
           </a:p>

</xml_diff>